<commit_message>
feature discussion slides update
</commit_message>
<xml_diff>
--- a/05 - Features/features-discussion.pptx
+++ b/05 - Features/features-discussion.pptx
@@ -5,7 +5,7 @@
     <p:sldMasterId id="2147483648" r:id="rId1"/>
   </p:sldMasterIdLst>
   <p:notesMasterIdLst>
-    <p:notesMasterId r:id="rId11"/>
+    <p:notesMasterId r:id="rId16"/>
   </p:notesMasterIdLst>
   <p:sldIdLst>
     <p:sldId id="256" r:id="rId2"/>
@@ -14,9 +14,14 @@
     <p:sldId id="318" r:id="rId5"/>
     <p:sldId id="323" r:id="rId6"/>
     <p:sldId id="309" r:id="rId7"/>
-    <p:sldId id="322" r:id="rId8"/>
-    <p:sldId id="295" r:id="rId9"/>
-    <p:sldId id="319" r:id="rId10"/>
+    <p:sldId id="325" r:id="rId8"/>
+    <p:sldId id="322" r:id="rId9"/>
+    <p:sldId id="321" r:id="rId10"/>
+    <p:sldId id="306" r:id="rId11"/>
+    <p:sldId id="295" r:id="rId12"/>
+    <p:sldId id="303" r:id="rId13"/>
+    <p:sldId id="320" r:id="rId14"/>
+    <p:sldId id="326" r:id="rId15"/>
   </p:sldIdLst>
   <p:sldSz cx="12192000" cy="6858000"/>
   <p:notesSz cx="6858000" cy="9144000"/>
@@ -254,7 +259,7 @@
       <p15:sldGuideLst xmlns:p15="http://schemas.microsoft.com/office/powerpoint/2012/main"/>
     </p:ext>
     <p:ext uri="http://customooxmlschemas.google.com/">
-      <go:slidesCustomData xmlns:go="http://customooxmlschemas.google.com/" xmlns:p15="http://schemas.microsoft.com/office/powerpoint/2012/main" xmlns:p14="http://schemas.microsoft.com/office/powerpoint/2010/main" xmlns:com="http://schemas.openxmlformats.org/drawingml/2006/compatibility" xmlns:pvml="urn:schemas-microsoft-com:office:powerpoint" xmlns:v="urn:schemas-microsoft-com:vml" xmlns:o="urn:schemas-microsoft-com:office:office" xmlns:dgm="http://schemas.openxmlformats.org/drawingml/2006/diagram" xmlns:c="http://schemas.openxmlformats.org/drawingml/2006/chart" xmlns:mv="urn:schemas-microsoft-com:mac:vml" xmlns:mc="http://schemas.openxmlformats.org/markup-compatibility/2006" xmlns="" r:id="rId40" roundtripDataSignature="AMtx7mjFyVUGRZWio+dc9dxzYsimUxNJbg=="/>
+      <go:slidesCustomData xmlns="" xmlns:mc="http://schemas.openxmlformats.org/markup-compatibility/2006" xmlns:mv="urn:schemas-microsoft-com:mac:vml" xmlns:c="http://schemas.openxmlformats.org/drawingml/2006/chart" xmlns:dgm="http://schemas.openxmlformats.org/drawingml/2006/diagram" xmlns:o="urn:schemas-microsoft-com:office:office" xmlns:v="urn:schemas-microsoft-com:vml" xmlns:pvml="urn:schemas-microsoft-com:office:powerpoint" xmlns:com="http://schemas.openxmlformats.org/drawingml/2006/compatibility" xmlns:p14="http://schemas.microsoft.com/office/powerpoint/2010/main" xmlns:p15="http://schemas.microsoft.com/office/powerpoint/2012/main" xmlns:go="http://customooxmlschemas.google.com/" r:id="rId40" roundtripDataSignature="AMtx7mjFyVUGRZWio+dc9dxzYsimUxNJbg=="/>
     </p:ext>
   </p:extLst>
 </p:presentation>
@@ -6711,7 +6716,7 @@
           <a:p>
             <a:fld id="{87916DAE-669F-3546-9A68-DB1260F5EB98}" type="slidenum">
               <a:rPr lang="en-US" smtClean="0"/>
-              <a:t>7</a:t>
+              <a:t>8</a:t>
             </a:fld>
             <a:endParaRPr lang="en-US"/>
           </a:p>
@@ -12300,6 +12305,692 @@
 </p:sld>
 </file>
 
+<file path=ppt/slides/slide10.xml><?xml version="1.0" encoding="utf-8"?>
+<p:sld xmlns:a="http://schemas.openxmlformats.org/drawingml/2006/main" xmlns:r="http://schemas.openxmlformats.org/officeDocument/2006/relationships" xmlns:p="http://schemas.openxmlformats.org/presentationml/2006/main">
+  <p:cSld>
+    <p:spTree>
+      <p:nvGrpSpPr>
+        <p:cNvPr id="1" name=""/>
+        <p:cNvGrpSpPr/>
+        <p:nvPr/>
+      </p:nvGrpSpPr>
+      <p:grpSpPr>
+        <a:xfrm>
+          <a:off x="0" y="0"/>
+          <a:ext cx="0" cy="0"/>
+          <a:chOff x="0" y="0"/>
+          <a:chExt cx="0" cy="0"/>
+        </a:xfrm>
+      </p:grpSpPr>
+      <p:sp>
+        <p:nvSpPr>
+          <p:cNvPr id="3" name="Title 2"/>
+          <p:cNvSpPr>
+            <a:spLocks noGrp="1"/>
+          </p:cNvSpPr>
+          <p:nvPr>
+            <p:ph type="title"/>
+          </p:nvPr>
+        </p:nvSpPr>
+        <p:spPr>
+          <a:xfrm>
+            <a:off x="415600" y="120028"/>
+            <a:ext cx="11360700" cy="763500"/>
+          </a:xfrm>
+        </p:spPr>
+        <p:txBody>
+          <a:bodyPr/>
+          <a:lstStyle/>
+          <a:p>
+            <a:r>
+              <a:rPr lang="en-US" dirty="0"/>
+              <a:t>Question for class discussion: Features are also model-dependent</a:t>
+            </a:r>
+          </a:p>
+        </p:txBody>
+      </p:sp>
+      <p:sp>
+        <p:nvSpPr>
+          <p:cNvPr id="2" name="Content Placeholder 1"/>
+          <p:cNvSpPr>
+            <a:spLocks noGrp="1"/>
+          </p:cNvSpPr>
+          <p:nvPr>
+            <p:ph type="body" idx="1"/>
+          </p:nvPr>
+        </p:nvSpPr>
+        <p:spPr/>
+        <p:txBody>
+          <a:bodyPr/>
+          <a:lstStyle/>
+          <a:p>
+            <a:endParaRPr lang="en-US" dirty="0"/>
+          </a:p>
+          <a:p>
+            <a:pPr marL="76200" indent="0">
+              <a:buNone/>
+            </a:pPr>
+            <a:endParaRPr lang="en-US" dirty="0"/>
+          </a:p>
+          <a:p>
+            <a:r>
+              <a:rPr lang="en-US" dirty="0"/>
+              <a:t>Linear models may need … ?</a:t>
+            </a:r>
+            <a:br>
+              <a:rPr lang="en-US" dirty="0"/>
+            </a:br>
+            <a:endParaRPr lang="en-US" dirty="0"/>
+          </a:p>
+          <a:p>
+            <a:r>
+              <a:rPr lang="en-US" dirty="0"/>
+              <a:t>Non-linear models may need …?</a:t>
+            </a:r>
+          </a:p>
+          <a:p>
+            <a:endParaRPr lang="en-US" dirty="0"/>
+          </a:p>
+        </p:txBody>
+      </p:sp>
+    </p:spTree>
+    <p:extLst>
+      <p:ext uri="{BB962C8B-B14F-4D97-AF65-F5344CB8AC3E}">
+        <p14:creationId xmlns:p14="http://schemas.microsoft.com/office/powerpoint/2010/main" val="3674935960"/>
+      </p:ext>
+    </p:extLst>
+  </p:cSld>
+  <p:clrMapOvr>
+    <a:masterClrMapping/>
+  </p:clrMapOvr>
+</p:sld>
+</file>
+
+<file path=ppt/slides/slide11.xml><?xml version="1.0" encoding="utf-8"?>
+<p:sld xmlns:a="http://schemas.openxmlformats.org/drawingml/2006/main" xmlns:r="http://schemas.openxmlformats.org/officeDocument/2006/relationships" xmlns:p="http://schemas.openxmlformats.org/presentationml/2006/main">
+  <p:cSld>
+    <p:spTree>
+      <p:nvGrpSpPr>
+        <p:cNvPr id="1" name=""/>
+        <p:cNvGrpSpPr/>
+        <p:nvPr/>
+      </p:nvGrpSpPr>
+      <p:grpSpPr>
+        <a:xfrm>
+          <a:off x="0" y="0"/>
+          <a:ext cx="0" cy="0"/>
+          <a:chOff x="0" y="0"/>
+          <a:chExt cx="0" cy="0"/>
+        </a:xfrm>
+      </p:grpSpPr>
+      <p:sp>
+        <p:nvSpPr>
+          <p:cNvPr id="3" name="Title 2">
+            <a:extLst>
+              <a:ext uri="{FF2B5EF4-FFF2-40B4-BE49-F238E27FC236}">
+                <a16:creationId xmlns:a16="http://schemas.microsoft.com/office/drawing/2014/main" id="{9323871C-7CA8-1448-8FFC-1AE6E1838941}"/>
+              </a:ext>
+            </a:extLst>
+          </p:cNvPr>
+          <p:cNvSpPr>
+            <a:spLocks noGrp="1"/>
+          </p:cNvSpPr>
+          <p:nvPr>
+            <p:ph type="title"/>
+          </p:nvPr>
+        </p:nvSpPr>
+        <p:spPr/>
+        <p:txBody>
+          <a:bodyPr/>
+          <a:lstStyle/>
+          <a:p>
+            <a:pPr algn="ctr"/>
+            <a:r>
+              <a:rPr lang="en-US" dirty="0"/>
+              <a:t>DISCUSSION QUESTION</a:t>
+            </a:r>
+          </a:p>
+        </p:txBody>
+      </p:sp>
+      <p:sp>
+        <p:nvSpPr>
+          <p:cNvPr id="4" name="Text Placeholder 3">
+            <a:extLst>
+              <a:ext uri="{FF2B5EF4-FFF2-40B4-BE49-F238E27FC236}">
+                <a16:creationId xmlns:a16="http://schemas.microsoft.com/office/drawing/2014/main" id="{5E600BA7-FA45-884F-9820-9E5F2CB7AA48}"/>
+              </a:ext>
+            </a:extLst>
+          </p:cNvPr>
+          <p:cNvSpPr>
+            <a:spLocks noGrp="1"/>
+          </p:cNvSpPr>
+          <p:nvPr>
+            <p:ph type="body" idx="1"/>
+          </p:nvPr>
+        </p:nvSpPr>
+        <p:spPr/>
+        <p:txBody>
+          <a:bodyPr/>
+          <a:lstStyle/>
+          <a:p>
+            <a:pPr marL="76200" indent="0">
+              <a:buNone/>
+            </a:pPr>
+            <a:endParaRPr lang="en-US" dirty="0"/>
+          </a:p>
+          <a:p>
+            <a:pPr marL="76200" indent="0">
+              <a:buNone/>
+            </a:pPr>
+            <a:endParaRPr lang="en-US" dirty="0"/>
+          </a:p>
+          <a:p>
+            <a:pPr marL="76200" indent="0" algn="ctr">
+              <a:buNone/>
+            </a:pPr>
+            <a:r>
+              <a:rPr lang="en-US" sz="3600" dirty="0"/>
+              <a:t>In your class project, what are two ways bias might </a:t>
+            </a:r>
+          </a:p>
+          <a:p>
+            <a:pPr marL="76200" indent="0" algn="ctr">
+              <a:buNone/>
+            </a:pPr>
+            <a:r>
+              <a:rPr lang="en-US" sz="3600" dirty="0"/>
+              <a:t>be introduced in your feature development?</a:t>
+            </a:r>
+          </a:p>
+        </p:txBody>
+      </p:sp>
+    </p:spTree>
+    <p:extLst>
+      <p:ext uri="{BB962C8B-B14F-4D97-AF65-F5344CB8AC3E}">
+        <p14:creationId xmlns:p14="http://schemas.microsoft.com/office/powerpoint/2010/main" val="3940342555"/>
+      </p:ext>
+    </p:extLst>
+  </p:cSld>
+  <p:clrMapOvr>
+    <a:masterClrMapping/>
+  </p:clrMapOvr>
+</p:sld>
+</file>
+
+<file path=ppt/slides/slide12.xml><?xml version="1.0" encoding="utf-8"?>
+<p:sld xmlns:a="http://schemas.openxmlformats.org/drawingml/2006/main" xmlns:r="http://schemas.openxmlformats.org/officeDocument/2006/relationships" xmlns:p="http://schemas.openxmlformats.org/presentationml/2006/main">
+  <p:cSld>
+    <p:spTree>
+      <p:nvGrpSpPr>
+        <p:cNvPr id="1" name=""/>
+        <p:cNvGrpSpPr/>
+        <p:nvPr/>
+      </p:nvGrpSpPr>
+      <p:grpSpPr>
+        <a:xfrm>
+          <a:off x="0" y="0"/>
+          <a:ext cx="0" cy="0"/>
+          <a:chOff x="0" y="0"/>
+          <a:chExt cx="0" cy="0"/>
+        </a:xfrm>
+      </p:grpSpPr>
+      <p:sp>
+        <p:nvSpPr>
+          <p:cNvPr id="3" name="Title 2"/>
+          <p:cNvSpPr>
+            <a:spLocks noGrp="1"/>
+          </p:cNvSpPr>
+          <p:nvPr>
+            <p:ph type="title"/>
+          </p:nvPr>
+        </p:nvSpPr>
+        <p:spPr/>
+        <p:txBody>
+          <a:bodyPr/>
+          <a:lstStyle/>
+          <a:p>
+            <a:r>
+              <a:rPr lang="en-US" dirty="0"/>
+              <a:t>Bias in Feature Development</a:t>
+            </a:r>
+          </a:p>
+        </p:txBody>
+      </p:sp>
+      <p:sp>
+        <p:nvSpPr>
+          <p:cNvPr id="2" name="Content Placeholder 1"/>
+          <p:cNvSpPr>
+            <a:spLocks noGrp="1"/>
+          </p:cNvSpPr>
+          <p:nvPr>
+            <p:ph type="body" idx="1"/>
+          </p:nvPr>
+        </p:nvSpPr>
+        <p:spPr/>
+        <p:txBody>
+          <a:bodyPr/>
+          <a:lstStyle/>
+          <a:p>
+            <a:r>
+              <a:rPr lang="en-US" dirty="0"/>
+              <a:t>Is your feature directly measuring what you want it to or a proxy? Is it an equally good proxy across groups?</a:t>
+            </a:r>
+            <a:br>
+              <a:rPr lang="en-US" dirty="0"/>
+            </a:br>
+            <a:endParaRPr lang="en-US" dirty="0"/>
+          </a:p>
+          <a:p>
+            <a:r>
+              <a:rPr lang="en-US" dirty="0"/>
+              <a:t>Is measurement error correlated to group membership?</a:t>
+            </a:r>
+            <a:br>
+              <a:rPr lang="en-US" dirty="0"/>
+            </a:br>
+            <a:endParaRPr lang="en-US" dirty="0"/>
+          </a:p>
+          <a:p>
+            <a:r>
+              <a:rPr lang="en-US" dirty="0"/>
+              <a:t>Does missingness vary across groups?</a:t>
+            </a:r>
+            <a:br>
+              <a:rPr lang="en-US" dirty="0"/>
+            </a:br>
+            <a:endParaRPr lang="en-US" dirty="0"/>
+          </a:p>
+          <a:p>
+            <a:r>
+              <a:rPr lang="en-US" dirty="0"/>
+              <a:t>How does predictiveness of your feature vary by group?</a:t>
+            </a:r>
+          </a:p>
+        </p:txBody>
+      </p:sp>
+    </p:spTree>
+    <p:extLst>
+      <p:ext uri="{BB962C8B-B14F-4D97-AF65-F5344CB8AC3E}">
+        <p14:creationId xmlns:p14="http://schemas.microsoft.com/office/powerpoint/2010/main" val="73709589"/>
+      </p:ext>
+    </p:extLst>
+  </p:cSld>
+  <p:clrMapOvr>
+    <a:masterClrMapping/>
+  </p:clrMapOvr>
+</p:sld>
+</file>
+
+<file path=ppt/slides/slide13.xml><?xml version="1.0" encoding="utf-8"?>
+<p:sld xmlns:a="http://schemas.openxmlformats.org/drawingml/2006/main" xmlns:r="http://schemas.openxmlformats.org/officeDocument/2006/relationships" xmlns:p="http://schemas.openxmlformats.org/presentationml/2006/main">
+  <p:cSld>
+    <p:spTree>
+      <p:nvGrpSpPr>
+        <p:cNvPr id="1" name=""/>
+        <p:cNvGrpSpPr/>
+        <p:nvPr/>
+      </p:nvGrpSpPr>
+      <p:grpSpPr>
+        <a:xfrm>
+          <a:off x="0" y="0"/>
+          <a:ext cx="0" cy="0"/>
+          <a:chOff x="0" y="0"/>
+          <a:chExt cx="0" cy="0"/>
+        </a:xfrm>
+      </p:grpSpPr>
+      <p:sp>
+        <p:nvSpPr>
+          <p:cNvPr id="3" name="Title 2"/>
+          <p:cNvSpPr>
+            <a:spLocks noGrp="1"/>
+          </p:cNvSpPr>
+          <p:nvPr>
+            <p:ph type="title"/>
+          </p:nvPr>
+        </p:nvSpPr>
+        <p:spPr/>
+        <p:txBody>
+          <a:bodyPr/>
+          <a:lstStyle/>
+          <a:p>
+            <a:r>
+              <a:rPr lang="en-US" dirty="0"/>
+              <a:t>Bias in Feature Development</a:t>
+            </a:r>
+          </a:p>
+        </p:txBody>
+      </p:sp>
+      <p:sp>
+        <p:nvSpPr>
+          <p:cNvPr id="2" name="Content Placeholder 1"/>
+          <p:cNvSpPr>
+            <a:spLocks noGrp="1"/>
+          </p:cNvSpPr>
+          <p:nvPr>
+            <p:ph type="body" idx="1"/>
+          </p:nvPr>
+        </p:nvSpPr>
+        <p:spPr/>
+        <p:txBody>
+          <a:bodyPr/>
+          <a:lstStyle/>
+          <a:p>
+            <a:r>
+              <a:rPr lang="en-US" dirty="0"/>
+              <a:t>Inferring age/gender from name</a:t>
+            </a:r>
+            <a:br>
+              <a:rPr lang="en-US" dirty="0"/>
+            </a:br>
+            <a:endParaRPr lang="en-US" dirty="0"/>
+          </a:p>
+          <a:p>
+            <a:r>
+              <a:rPr lang="en-US" dirty="0"/>
+              <a:t>Creating "other" categories, e.g., multi-racial or non-binary gender</a:t>
+            </a:r>
+            <a:br>
+              <a:rPr lang="en-US" dirty="0"/>
+            </a:br>
+            <a:endParaRPr lang="en-US" dirty="0"/>
+          </a:p>
+          <a:p>
+            <a:r>
+              <a:rPr lang="en-US" dirty="0"/>
+              <a:t>How are race and ethnicity collected? Self-reported? Recorded by third party? Inferred from other data?</a:t>
+            </a:r>
+            <a:br>
+              <a:rPr lang="en-US" dirty="0"/>
+            </a:br>
+            <a:endParaRPr lang="en-US" dirty="0"/>
+          </a:p>
+          <a:p>
+            <a:r>
+              <a:rPr lang="en-US" dirty="0"/>
+              <a:t>Geocoding for distance or geographic features –– how are homeless and more mobile populations handled?</a:t>
+            </a:r>
+          </a:p>
+        </p:txBody>
+      </p:sp>
+    </p:spTree>
+    <p:extLst>
+      <p:ext uri="{BB962C8B-B14F-4D97-AF65-F5344CB8AC3E}">
+        <p14:creationId xmlns:p14="http://schemas.microsoft.com/office/powerpoint/2010/main" val="163788270"/>
+      </p:ext>
+    </p:extLst>
+  </p:cSld>
+  <p:clrMapOvr>
+    <a:masterClrMapping/>
+  </p:clrMapOvr>
+  <p:timing>
+    <p:tnLst>
+      <p:par>
+        <p:cTn id="1" dur="indefinite" restart="never" nodeType="tmRoot">
+          <p:childTnLst>
+            <p:seq concurrent="1" nextAc="seek">
+              <p:cTn id="2" dur="indefinite" nodeType="mainSeq">
+                <p:childTnLst>
+                  <p:par>
+                    <p:cTn id="3" fill="hold">
+                      <p:stCondLst>
+                        <p:cond delay="indefinite"/>
+                      </p:stCondLst>
+                      <p:childTnLst>
+                        <p:par>
+                          <p:cTn id="4" fill="hold">
+                            <p:stCondLst>
+                              <p:cond delay="0"/>
+                            </p:stCondLst>
+                            <p:childTnLst>
+                              <p:par>
+                                <p:cTn id="5" presetID="1" presetClass="entr" presetSubtype="0" fill="hold" grpId="0" nodeType="clickEffect">
+                                  <p:stCondLst>
+                                    <p:cond delay="0"/>
+                                  </p:stCondLst>
+                                  <p:childTnLst>
+                                    <p:set>
+                                      <p:cBhvr>
+                                        <p:cTn id="6" dur="1" fill="hold">
+                                          <p:stCondLst>
+                                            <p:cond delay="0"/>
+                                          </p:stCondLst>
+                                        </p:cTn>
+                                        <p:tgtEl>
+                                          <p:spTgt spid="2"/>
+                                        </p:tgtEl>
+                                        <p:attrNameLst>
+                                          <p:attrName>style.visibility</p:attrName>
+                                        </p:attrNameLst>
+                                      </p:cBhvr>
+                                      <p:to>
+                                        <p:strVal val="visible"/>
+                                      </p:to>
+                                    </p:set>
+                                  </p:childTnLst>
+                                </p:cTn>
+                              </p:par>
+                            </p:childTnLst>
+                          </p:cTn>
+                        </p:par>
+                      </p:childTnLst>
+                    </p:cTn>
+                  </p:par>
+                </p:childTnLst>
+              </p:cTn>
+              <p:prevCondLst>
+                <p:cond evt="onPrev" delay="0">
+                  <p:tgtEl>
+                    <p:sldTgt/>
+                  </p:tgtEl>
+                </p:cond>
+              </p:prevCondLst>
+              <p:nextCondLst>
+                <p:cond evt="onNext" delay="0">
+                  <p:tgtEl>
+                    <p:sldTgt/>
+                  </p:tgtEl>
+                </p:cond>
+              </p:nextCondLst>
+            </p:seq>
+          </p:childTnLst>
+        </p:cTn>
+      </p:par>
+    </p:tnLst>
+    <p:bldLst>
+      <p:bldP spid="2" grpId="0" uiExpand="1"/>
+    </p:bldLst>
+  </p:timing>
+</p:sld>
+</file>
+
+<file path=ppt/slides/slide14.xml><?xml version="1.0" encoding="utf-8"?>
+<p:sld xmlns:a="http://schemas.openxmlformats.org/drawingml/2006/main" xmlns:r="http://schemas.openxmlformats.org/officeDocument/2006/relationships" xmlns:p="http://schemas.openxmlformats.org/presentationml/2006/main">
+  <p:cSld>
+    <p:spTree>
+      <p:nvGrpSpPr>
+        <p:cNvPr id="1" name=""/>
+        <p:cNvGrpSpPr/>
+        <p:nvPr/>
+      </p:nvGrpSpPr>
+      <p:grpSpPr>
+        <a:xfrm>
+          <a:off x="0" y="0"/>
+          <a:ext cx="0" cy="0"/>
+          <a:chOff x="0" y="0"/>
+          <a:chExt cx="0" cy="0"/>
+        </a:xfrm>
+      </p:grpSpPr>
+      <p:sp>
+        <p:nvSpPr>
+          <p:cNvPr id="3" name="Title 2">
+            <a:extLst>
+              <a:ext uri="{FF2B5EF4-FFF2-40B4-BE49-F238E27FC236}">
+                <a16:creationId xmlns:a16="http://schemas.microsoft.com/office/drawing/2014/main" id="{9323871C-7CA8-1448-8FFC-1AE6E1838941}"/>
+              </a:ext>
+            </a:extLst>
+          </p:cNvPr>
+          <p:cNvSpPr>
+            <a:spLocks noGrp="1"/>
+          </p:cNvSpPr>
+          <p:nvPr>
+            <p:ph type="title"/>
+          </p:nvPr>
+        </p:nvSpPr>
+        <p:spPr/>
+        <p:txBody>
+          <a:bodyPr/>
+          <a:lstStyle/>
+          <a:p>
+            <a:r>
+              <a:rPr lang="en-US" dirty="0"/>
+              <a:t>Things to remember</a:t>
+            </a:r>
+          </a:p>
+        </p:txBody>
+      </p:sp>
+      <p:sp>
+        <p:nvSpPr>
+          <p:cNvPr id="4" name="Text Placeholder 3">
+            <a:extLst>
+              <a:ext uri="{FF2B5EF4-FFF2-40B4-BE49-F238E27FC236}">
+                <a16:creationId xmlns:a16="http://schemas.microsoft.com/office/drawing/2014/main" id="{5E600BA7-FA45-884F-9820-9E5F2CB7AA48}"/>
+              </a:ext>
+            </a:extLst>
+          </p:cNvPr>
+          <p:cNvSpPr>
+            <a:spLocks noGrp="1"/>
+          </p:cNvSpPr>
+          <p:nvPr>
+            <p:ph type="body" idx="1"/>
+          </p:nvPr>
+        </p:nvSpPr>
+        <p:spPr>
+          <a:xfrm>
+            <a:off x="415600" y="1388349"/>
+            <a:ext cx="11360700" cy="4555200"/>
+          </a:xfrm>
+        </p:spPr>
+        <p:txBody>
+          <a:bodyPr/>
+          <a:lstStyle/>
+          <a:p>
+            <a:r>
+              <a:rPr lang="en-US" dirty="0"/>
+              <a:t>Due Friday: Proposal Peer Reviews</a:t>
+            </a:r>
+            <a:br>
+              <a:rPr lang="en-US" dirty="0"/>
+            </a:br>
+            <a:endParaRPr lang="en-US" dirty="0"/>
+          </a:p>
+          <a:p>
+            <a:r>
+              <a:rPr lang="en-US" dirty="0"/>
+              <a:t>Tech Sessions Tomorrow:</a:t>
+            </a:r>
+          </a:p>
+          <a:p>
+            <a:pPr lvl="1">
+              <a:spcBef>
+                <a:spcPts val="0"/>
+              </a:spcBef>
+            </a:pPr>
+            <a:r>
+              <a:rPr lang="en-US" sz="2200" dirty="0"/>
+              <a:t>Remote Tech Workflows</a:t>
+            </a:r>
+          </a:p>
+          <a:p>
+            <a:pPr lvl="1">
+              <a:spcBef>
+                <a:spcPts val="0"/>
+              </a:spcBef>
+            </a:pPr>
+            <a:r>
+              <a:rPr lang="en-US" sz="2200" dirty="0"/>
+              <a:t>Python + SQL / Advanced SQL</a:t>
+            </a:r>
+          </a:p>
+          <a:p>
+            <a:pPr lvl="1">
+              <a:spcBef>
+                <a:spcPts val="0"/>
+              </a:spcBef>
+            </a:pPr>
+            <a:r>
+              <a:rPr lang="en-US" sz="2200" dirty="0"/>
+              <a:t>Running both in parallel (choose the one of more interest and watch other on video as needed, or stay for both 5:10 and 6:40 sessions if you have time)</a:t>
+            </a:r>
+            <a:br>
+              <a:rPr lang="en-US" sz="2400" dirty="0"/>
+            </a:br>
+            <a:endParaRPr lang="en-US" sz="2400" dirty="0"/>
+          </a:p>
+          <a:p>
+            <a:r>
+              <a:rPr lang="en-US" dirty="0"/>
+              <a:t>Next week</a:t>
+            </a:r>
+          </a:p>
+          <a:p>
+            <a:pPr lvl="1">
+              <a:spcBef>
+                <a:spcPts val="0"/>
+              </a:spcBef>
+            </a:pPr>
+            <a:r>
+              <a:rPr lang="en-US" sz="2200" dirty="0"/>
+              <a:t>Monday: Self + Peer Contribution Survey</a:t>
+            </a:r>
+          </a:p>
+          <a:p>
+            <a:pPr lvl="1">
+              <a:spcBef>
+                <a:spcPts val="0"/>
+              </a:spcBef>
+            </a:pPr>
+            <a:r>
+              <a:rPr lang="en-US" sz="2200" dirty="0"/>
+              <a:t>Group check-ins start on Wednesday</a:t>
+            </a:r>
+          </a:p>
+          <a:p>
+            <a:pPr lvl="1">
+              <a:spcBef>
+                <a:spcPts val="0"/>
+              </a:spcBef>
+            </a:pPr>
+            <a:r>
+              <a:rPr lang="en-US" sz="2200" dirty="0"/>
+              <a:t>Video + Reading for Tuesday</a:t>
+            </a:r>
+          </a:p>
+          <a:p>
+            <a:pPr lvl="1">
+              <a:spcBef>
+                <a:spcPts val="0"/>
+              </a:spcBef>
+            </a:pPr>
+            <a:r>
+              <a:rPr lang="en-US" sz="2200" dirty="0"/>
+              <a:t>Due next Friday: project updates (analytical formulation, baselines, skeleton code)</a:t>
+            </a:r>
+          </a:p>
+        </p:txBody>
+      </p:sp>
+    </p:spTree>
+    <p:extLst>
+      <p:ext uri="{BB962C8B-B14F-4D97-AF65-F5344CB8AC3E}">
+        <p14:creationId xmlns:p14="http://schemas.microsoft.com/office/powerpoint/2010/main" val="2718674369"/>
+      </p:ext>
+    </p:extLst>
+  </p:cSld>
+  <p:clrMapOvr>
+    <a:masterClrMapping/>
+  </p:clrMapOvr>
+</p:sld>
+</file>
+
 <file path=ppt/slides/slide2.xml><?xml version="1.0" encoding="utf-8"?>
 <p:sld xmlns:a="http://schemas.openxmlformats.org/drawingml/2006/main" xmlns:r="http://schemas.openxmlformats.org/officeDocument/2006/relationships" xmlns:p="http://schemas.openxmlformats.org/presentationml/2006/main">
   <p:cSld>
@@ -12427,7 +13118,12 @@
             <p:ph type="body" idx="1"/>
           </p:nvPr>
         </p:nvSpPr>
-        <p:spPr/>
+        <p:spPr>
+          <a:xfrm>
+            <a:off x="415600" y="1388349"/>
+            <a:ext cx="11360700" cy="4555200"/>
+          </a:xfrm>
+        </p:spPr>
         <p:txBody>
           <a:bodyPr/>
           <a:lstStyle/>
@@ -12498,6 +13194,17 @@
             </a:pPr>
             <a:r>
               <a:rPr lang="en-US" sz="2200" dirty="0"/>
+              <a:t>Monday: Self + Peer Contribution Survey</a:t>
+            </a:r>
+          </a:p>
+          <a:p>
+            <a:pPr lvl="1">
+              <a:spcBef>
+                <a:spcPts val="0"/>
+              </a:spcBef>
+            </a:pPr>
+            <a:r>
+              <a:rPr lang="en-US" sz="2200" dirty="0"/>
               <a:t>Group check-ins start on Wednesday</a:t>
             </a:r>
           </a:p>
@@ -12509,7 +13216,7 @@
             </a:pPr>
             <a:r>
               <a:rPr lang="en-US" sz="2200" dirty="0"/>
-              <a:t>Video + Reading for Tuesday</a:t>
+              <a:t>Reading for Tuesday</a:t>
             </a:r>
           </a:p>
           <a:p>
@@ -12832,7 +13539,7 @@
           <a:p>
             <a:r>
               <a:rPr lang="en-US" dirty="0"/>
-              <a:t>Reminder: Practical Pointers</a:t>
+              <a:t>Reminder: Practical Pointers for Features</a:t>
             </a:r>
           </a:p>
         </p:txBody>
@@ -12942,6 +13649,119 @@
       </p:grpSpPr>
       <p:sp>
         <p:nvSpPr>
+          <p:cNvPr id="2" name="Title 1">
+            <a:extLst>
+              <a:ext uri="{FF2B5EF4-FFF2-40B4-BE49-F238E27FC236}">
+                <a16:creationId xmlns:a16="http://schemas.microsoft.com/office/drawing/2014/main" id="{D5568ADA-C1EF-2741-BD8A-A472FF070613}"/>
+              </a:ext>
+            </a:extLst>
+          </p:cNvPr>
+          <p:cNvSpPr>
+            <a:spLocks noGrp="1"/>
+          </p:cNvSpPr>
+          <p:nvPr>
+            <p:ph type="title"/>
+          </p:nvPr>
+        </p:nvSpPr>
+        <p:spPr/>
+        <p:txBody>
+          <a:bodyPr/>
+          <a:lstStyle/>
+          <a:p>
+            <a:r>
+              <a:rPr lang="en-US" dirty="0"/>
+              <a:t>Reminder: Missing Value Tips</a:t>
+            </a:r>
+          </a:p>
+        </p:txBody>
+      </p:sp>
+      <p:sp>
+        <p:nvSpPr>
+          <p:cNvPr id="3" name="Text Placeholder 2">
+            <a:extLst>
+              <a:ext uri="{FF2B5EF4-FFF2-40B4-BE49-F238E27FC236}">
+                <a16:creationId xmlns:a16="http://schemas.microsoft.com/office/drawing/2014/main" id="{D88AE774-4907-F841-8BD3-E9ECDB6BD8E8}"/>
+              </a:ext>
+            </a:extLst>
+          </p:cNvPr>
+          <p:cNvSpPr>
+            <a:spLocks noGrp="1"/>
+          </p:cNvSpPr>
+          <p:nvPr>
+            <p:ph type="body" idx="1"/>
+          </p:nvPr>
+        </p:nvSpPr>
+        <p:spPr/>
+        <p:txBody>
+          <a:bodyPr/>
+          <a:lstStyle/>
+          <a:p>
+            <a:r>
+              <a:rPr lang="en-US" dirty="0"/>
+              <a:t>Do not remove rows or columns with missing values (unless there is a really really really good reason)</a:t>
+            </a:r>
+          </a:p>
+          <a:p>
+            <a:endParaRPr lang="en-US" dirty="0"/>
+          </a:p>
+          <a:p>
+            <a:r>
+              <a:rPr lang="en-US" dirty="0"/>
+              <a:t>Missingness can be a useful predictor: create a flag even if you impute a value</a:t>
+            </a:r>
+          </a:p>
+          <a:p>
+            <a:endParaRPr lang="en-US" dirty="0"/>
+          </a:p>
+          <a:p>
+            <a:r>
+              <a:rPr lang="en-US" dirty="0"/>
+              <a:t>Data can be missing for different reasons and missingness for each row/column/cell may need to be handled differently</a:t>
+            </a:r>
+          </a:p>
+          <a:p>
+            <a:endParaRPr lang="en-US" dirty="0"/>
+          </a:p>
+          <a:p>
+            <a:r>
+              <a:rPr lang="en-US" dirty="0"/>
+              <a:t>Only use data from the past for imputation</a:t>
+            </a:r>
+          </a:p>
+        </p:txBody>
+      </p:sp>
+    </p:spTree>
+    <p:extLst>
+      <p:ext uri="{BB962C8B-B14F-4D97-AF65-F5344CB8AC3E}">
+        <p14:creationId xmlns:p14="http://schemas.microsoft.com/office/powerpoint/2010/main" val="3516067604"/>
+      </p:ext>
+    </p:extLst>
+  </p:cSld>
+  <p:clrMapOvr>
+    <a:masterClrMapping/>
+  </p:clrMapOvr>
+</p:sld>
+</file>
+
+<file path=ppt/slides/slide8.xml><?xml version="1.0" encoding="utf-8"?>
+<p:sld xmlns:a="http://schemas.openxmlformats.org/drawingml/2006/main" xmlns:r="http://schemas.openxmlformats.org/officeDocument/2006/relationships" xmlns:p="http://schemas.openxmlformats.org/presentationml/2006/main">
+  <p:cSld>
+    <p:spTree>
+      <p:nvGrpSpPr>
+        <p:cNvPr id="1" name=""/>
+        <p:cNvGrpSpPr/>
+        <p:nvPr/>
+      </p:nvGrpSpPr>
+      <p:grpSpPr>
+        <a:xfrm>
+          <a:off x="0" y="0"/>
+          <a:ext cx="0" cy="0"/>
+          <a:chOff x="0" y="0"/>
+          <a:chExt cx="0" cy="0"/>
+        </a:xfrm>
+      </p:grpSpPr>
+      <p:sp>
+        <p:nvSpPr>
           <p:cNvPr id="3" name="Title 2"/>
           <p:cNvSpPr>
             <a:spLocks noGrp="1"/>
@@ -12975,117 +13795,6 @@
 </p:sld>
 </file>
 
-<file path=ppt/slides/slide8.xml><?xml version="1.0" encoding="utf-8"?>
-<p:sld xmlns:a="http://schemas.openxmlformats.org/drawingml/2006/main" xmlns:r="http://schemas.openxmlformats.org/officeDocument/2006/relationships" xmlns:p="http://schemas.openxmlformats.org/presentationml/2006/main">
-  <p:cSld>
-    <p:spTree>
-      <p:nvGrpSpPr>
-        <p:cNvPr id="1" name=""/>
-        <p:cNvGrpSpPr/>
-        <p:nvPr/>
-      </p:nvGrpSpPr>
-      <p:grpSpPr>
-        <a:xfrm>
-          <a:off x="0" y="0"/>
-          <a:ext cx="0" cy="0"/>
-          <a:chOff x="0" y="0"/>
-          <a:chExt cx="0" cy="0"/>
-        </a:xfrm>
-      </p:grpSpPr>
-      <p:sp>
-        <p:nvSpPr>
-          <p:cNvPr id="3" name="Title 2">
-            <a:extLst>
-              <a:ext uri="{FF2B5EF4-FFF2-40B4-BE49-F238E27FC236}">
-                <a16:creationId xmlns:a16="http://schemas.microsoft.com/office/drawing/2014/main" id="{9323871C-7CA8-1448-8FFC-1AE6E1838941}"/>
-              </a:ext>
-            </a:extLst>
-          </p:cNvPr>
-          <p:cNvSpPr>
-            <a:spLocks noGrp="1"/>
-          </p:cNvSpPr>
-          <p:nvPr>
-            <p:ph type="title"/>
-          </p:nvPr>
-        </p:nvSpPr>
-        <p:spPr/>
-        <p:txBody>
-          <a:bodyPr/>
-          <a:lstStyle/>
-          <a:p>
-            <a:pPr algn="ctr"/>
-            <a:r>
-              <a:rPr lang="en-US" dirty="0"/>
-              <a:t>DISCUSSION QUESTION</a:t>
-            </a:r>
-          </a:p>
-        </p:txBody>
-      </p:sp>
-      <p:sp>
-        <p:nvSpPr>
-          <p:cNvPr id="4" name="Text Placeholder 3">
-            <a:extLst>
-              <a:ext uri="{FF2B5EF4-FFF2-40B4-BE49-F238E27FC236}">
-                <a16:creationId xmlns:a16="http://schemas.microsoft.com/office/drawing/2014/main" id="{5E600BA7-FA45-884F-9820-9E5F2CB7AA48}"/>
-              </a:ext>
-            </a:extLst>
-          </p:cNvPr>
-          <p:cNvSpPr>
-            <a:spLocks noGrp="1"/>
-          </p:cNvSpPr>
-          <p:nvPr>
-            <p:ph type="body" idx="1"/>
-          </p:nvPr>
-        </p:nvSpPr>
-        <p:spPr/>
-        <p:txBody>
-          <a:bodyPr/>
-          <a:lstStyle/>
-          <a:p>
-            <a:pPr marL="76200" indent="0">
-              <a:buNone/>
-            </a:pPr>
-            <a:endParaRPr lang="en-US" dirty="0"/>
-          </a:p>
-          <a:p>
-            <a:pPr marL="76200" indent="0">
-              <a:buNone/>
-            </a:pPr>
-            <a:endParaRPr lang="en-US" dirty="0"/>
-          </a:p>
-          <a:p>
-            <a:pPr marL="76200" indent="0" algn="ctr">
-              <a:buNone/>
-            </a:pPr>
-            <a:r>
-              <a:rPr lang="en-US" sz="3600" dirty="0"/>
-              <a:t>In your class project, what are two ways bias might </a:t>
-            </a:r>
-          </a:p>
-          <a:p>
-            <a:pPr marL="76200" indent="0" algn="ctr">
-              <a:buNone/>
-            </a:pPr>
-            <a:r>
-              <a:rPr lang="en-US" sz="3600" dirty="0"/>
-              <a:t>be introduced in your feature development?</a:t>
-            </a:r>
-          </a:p>
-        </p:txBody>
-      </p:sp>
-    </p:spTree>
-    <p:extLst>
-      <p:ext uri="{BB962C8B-B14F-4D97-AF65-F5344CB8AC3E}">
-        <p14:creationId xmlns:p14="http://schemas.microsoft.com/office/powerpoint/2010/main" val="3940342555"/>
-      </p:ext>
-    </p:extLst>
-  </p:cSld>
-  <p:clrMapOvr>
-    <a:masterClrMapping/>
-  </p:clrMapOvr>
-</p:sld>
-</file>
-
 <file path=ppt/slides/slide9.xml><?xml version="1.0" encoding="utf-8"?>
 <p:sld xmlns:a="http://schemas.openxmlformats.org/drawingml/2006/main" xmlns:r="http://schemas.openxmlformats.org/officeDocument/2006/relationships" xmlns:p="http://schemas.openxmlformats.org/presentationml/2006/main">
   <p:cSld>
@@ -13105,13 +13814,7 @@
       </p:grpSpPr>
       <p:sp>
         <p:nvSpPr>
-          <p:cNvPr id="3" name="Title 2">
-            <a:extLst>
-              <a:ext uri="{FF2B5EF4-FFF2-40B4-BE49-F238E27FC236}">
-                <a16:creationId xmlns:a16="http://schemas.microsoft.com/office/drawing/2014/main" id="{9323871C-7CA8-1448-8FFC-1AE6E1838941}"/>
-              </a:ext>
-            </a:extLst>
-          </p:cNvPr>
+          <p:cNvPr id="3" name="Title 2"/>
           <p:cNvSpPr>
             <a:spLocks noGrp="1"/>
           </p:cNvSpPr>
@@ -13119,27 +13822,26 @@
             <p:ph type="title"/>
           </p:nvPr>
         </p:nvSpPr>
-        <p:spPr/>
+        <p:spPr>
+          <a:xfrm>
+            <a:off x="-107576" y="367459"/>
+            <a:ext cx="12299576" cy="763500"/>
+          </a:xfrm>
+        </p:spPr>
         <p:txBody>
           <a:bodyPr/>
           <a:lstStyle/>
           <a:p>
             <a:r>
               <a:rPr lang="en-US" dirty="0"/>
-              <a:t>Things to remember</a:t>
+              <a:t>Question for class discussion:  Is Scaling Important for…</a:t>
             </a:r>
           </a:p>
         </p:txBody>
       </p:sp>
       <p:sp>
         <p:nvSpPr>
-          <p:cNvPr id="4" name="Text Placeholder 3">
-            <a:extLst>
-              <a:ext uri="{FF2B5EF4-FFF2-40B4-BE49-F238E27FC236}">
-                <a16:creationId xmlns:a16="http://schemas.microsoft.com/office/drawing/2014/main" id="{5E600BA7-FA45-884F-9820-9E5F2CB7AA48}"/>
-              </a:ext>
-            </a:extLst>
-          </p:cNvPr>
+          <p:cNvPr id="2" name="Content Placeholder 1"/>
           <p:cNvSpPr>
             <a:spLocks noGrp="1"/>
           </p:cNvSpPr>
@@ -13154,7 +13856,7 @@
           <a:p>
             <a:r>
               <a:rPr lang="en-US" dirty="0"/>
-              <a:t>Due Friday: Proposal Peer Reviews</a:t>
+              <a:t>Decision Trees?</a:t>
             </a:r>
             <a:br>
               <a:rPr lang="en-US" dirty="0"/>
@@ -13164,91 +13866,47 @@
           <a:p>
             <a:r>
               <a:rPr lang="en-US" dirty="0"/>
-              <a:t>Tech Sessions Tomorrow:</a:t>
-            </a:r>
-          </a:p>
-          <a:p>
-            <a:pPr lvl="1">
-              <a:spcBef>
-                <a:spcPts val="0"/>
-              </a:spcBef>
-            </a:pPr>
-            <a:r>
-              <a:rPr lang="en-US" sz="2200" dirty="0"/>
-              <a:t>Remote Tech Workflows</a:t>
-            </a:r>
-          </a:p>
-          <a:p>
-            <a:pPr lvl="1">
-              <a:spcBef>
-                <a:spcPts val="0"/>
-              </a:spcBef>
-            </a:pPr>
-            <a:r>
-              <a:rPr lang="en-US" sz="2200" dirty="0"/>
-              <a:t>Python + SQL / Advanced SQL</a:t>
-            </a:r>
-          </a:p>
-          <a:p>
-            <a:pPr lvl="1">
-              <a:spcBef>
-                <a:spcPts val="0"/>
-              </a:spcBef>
-            </a:pPr>
-            <a:r>
-              <a:rPr lang="en-US" sz="2200" dirty="0"/>
-              <a:t>Running both in parallel (choose the one of more interest and watch other on video as needed, or stay for both 5:10 and 6:40 sessions if you have time)</a:t>
+              <a:t>k-Nearest Neighbors?</a:t>
             </a:r>
             <a:br>
-              <a:rPr lang="en-US" sz="2400" dirty="0"/>
+              <a:rPr lang="en-US" dirty="0"/>
             </a:br>
-            <a:endParaRPr lang="en-US" sz="2400" dirty="0"/>
+            <a:endParaRPr lang="en-US" dirty="0"/>
           </a:p>
           <a:p>
             <a:r>
               <a:rPr lang="en-US" dirty="0"/>
-              <a:t>Next week</a:t>
+              <a:t>Random Forest?</a:t>
+            </a:r>
+            <a:br>
+              <a:rPr lang="en-US" dirty="0"/>
+            </a:br>
+            <a:endParaRPr lang="en-US" dirty="0"/>
+          </a:p>
+          <a:p>
+            <a:r>
+              <a:rPr lang="en-US" dirty="0"/>
+              <a:t>Logistic Regression?</a:t>
             </a:r>
           </a:p>
           <a:p>
-            <a:pPr lvl="1">
-              <a:spcBef>
-                <a:spcPts val="0"/>
-              </a:spcBef>
-            </a:pPr>
+            <a:endParaRPr lang="en-US" dirty="0"/>
+          </a:p>
+          <a:p>
             <a:r>
-              <a:rPr lang="en-US" sz="2200" dirty="0"/>
-              <a:t>Group check-ins start on Wednesday</a:t>
+              <a:rPr lang="en-US" dirty="0"/>
+              <a:t>Neural Nets?</a:t>
             </a:r>
           </a:p>
           <a:p>
-            <a:pPr lvl="1">
-              <a:spcBef>
-                <a:spcPts val="0"/>
-              </a:spcBef>
-            </a:pPr>
-            <a:r>
-              <a:rPr lang="en-US" sz="2200" dirty="0"/>
-              <a:t>Video + Reading for Tuesday</a:t>
-            </a:r>
-          </a:p>
-          <a:p>
-            <a:pPr lvl="1">
-              <a:spcBef>
-                <a:spcPts val="0"/>
-              </a:spcBef>
-            </a:pPr>
-            <a:r>
-              <a:rPr lang="en-US" sz="2200" dirty="0"/>
-              <a:t>Due next Friday: project updates (analytical formulation, baselines, skeleton code)</a:t>
-            </a:r>
+            <a:endParaRPr lang="en-US" dirty="0"/>
           </a:p>
         </p:txBody>
       </p:sp>
     </p:spTree>
     <p:extLst>
       <p:ext uri="{BB962C8B-B14F-4D97-AF65-F5344CB8AC3E}">
-        <p14:creationId xmlns:p14="http://schemas.microsoft.com/office/powerpoint/2010/main" val="3096972164"/>
+        <p14:creationId xmlns:p14="http://schemas.microsoft.com/office/powerpoint/2010/main" val="248718445"/>
       </p:ext>
     </p:extLst>
   </p:cSld>

</xml_diff>

<commit_message>
features discussion slide updates
</commit_message>
<xml_diff>
--- a/05 - Features/features-discussion.pptx
+++ b/05 - Features/features-discussion.pptx
@@ -259,7 +259,7 @@
       <p15:sldGuideLst xmlns:p15="http://schemas.microsoft.com/office/powerpoint/2012/main"/>
     </p:ext>
     <p:ext uri="http://customooxmlschemas.google.com/">
-      <go:slidesCustomData xmlns="" xmlns:mc="http://schemas.openxmlformats.org/markup-compatibility/2006" xmlns:mv="urn:schemas-microsoft-com:mac:vml" xmlns:c="http://schemas.openxmlformats.org/drawingml/2006/chart" xmlns:dgm="http://schemas.openxmlformats.org/drawingml/2006/diagram" xmlns:o="urn:schemas-microsoft-com:office:office" xmlns:v="urn:schemas-microsoft-com:vml" xmlns:pvml="urn:schemas-microsoft-com:office:powerpoint" xmlns:com="http://schemas.openxmlformats.org/drawingml/2006/compatibility" xmlns:p14="http://schemas.microsoft.com/office/powerpoint/2010/main" xmlns:p15="http://schemas.microsoft.com/office/powerpoint/2012/main" xmlns:go="http://customooxmlschemas.google.com/" r:id="rId40" roundtripDataSignature="AMtx7mjFyVUGRZWio+dc9dxzYsimUxNJbg=="/>
+      <go:slidesCustomData xmlns:go="http://customooxmlschemas.google.com/" xmlns:p15="http://schemas.microsoft.com/office/powerpoint/2012/main" xmlns:p14="http://schemas.microsoft.com/office/powerpoint/2010/main" xmlns:com="http://schemas.openxmlformats.org/drawingml/2006/compatibility" xmlns:pvml="urn:schemas-microsoft-com:office:powerpoint" xmlns:v="urn:schemas-microsoft-com:vml" xmlns:o="urn:schemas-microsoft-com:office:office" xmlns:dgm="http://schemas.openxmlformats.org/drawingml/2006/diagram" xmlns:c="http://schemas.openxmlformats.org/drawingml/2006/chart" xmlns:mv="urn:schemas-microsoft-com:mac:vml" xmlns:mc="http://schemas.openxmlformats.org/markup-compatibility/2006" xmlns="" r:id="rId40" roundtripDataSignature="AMtx7mjFyVUGRZWio+dc9dxzYsimUxNJbg=="/>
     </p:ext>
   </p:extLst>
 </p:presentation>
@@ -12447,7 +12447,7 @@
             <a:pPr algn="ctr"/>
             <a:r>
               <a:rPr lang="en-US" dirty="0"/>
-              <a:t>DISCUSSION QUESTION</a:t>
+              <a:t>BREAKOUT SESSION</a:t>
             </a:r>
           </a:p>
         </p:txBody>
@@ -12490,7 +12490,7 @@
             </a:pPr>
             <a:r>
               <a:rPr lang="en-US" sz="3600" dirty="0"/>
-              <a:t>In your class project, what are two ways bias might </a:t>
+              <a:t>In your class project, what are some features you’re considering building and how might bias might </a:t>
             </a:r>
           </a:p>
           <a:p>
@@ -12501,6 +12501,97 @@
               <a:rPr lang="en-US" sz="3600" dirty="0"/>
               <a:t>be introduced in your feature development?</a:t>
             </a:r>
+          </a:p>
+          <a:p>
+            <a:pPr marL="76200" indent="0" algn="ctr">
+              <a:buNone/>
+            </a:pPr>
+            <a:endParaRPr lang="en-US" sz="3600" dirty="0"/>
+          </a:p>
+          <a:p>
+            <a:pPr marL="76200" indent="0" algn="ctr">
+              <a:buNone/>
+            </a:pPr>
+            <a:r>
+              <a:rPr lang="en-US" sz="3600" dirty="0">
+                <a:solidFill>
+                  <a:srgbClr val="00B0F0"/>
+                </a:solidFill>
+                <a:hlinkClick r:id="rId2">
+                  <a:extLst>
+                    <a:ext uri="{A12FA001-AC4F-418D-AE19-62706E023703}">
+                      <ahyp:hlinkClr xmlns:ahyp="http://schemas.microsoft.com/office/drawing/2018/hyperlinkcolor" val="tx"/>
+                    </a:ext>
+                  </a:extLst>
+                </a:hlinkClick>
+              </a:rPr>
+              <a:t>http://</a:t>
+            </a:r>
+            <a:r>
+              <a:rPr lang="en-US" sz="3600" dirty="0" err="1">
+                <a:solidFill>
+                  <a:srgbClr val="00B0F0"/>
+                </a:solidFill>
+                <a:hlinkClick r:id="rId2">
+                  <a:extLst>
+                    <a:ext uri="{A12FA001-AC4F-418D-AE19-62706E023703}">
+                      <ahyp:hlinkClr xmlns:ahyp="http://schemas.microsoft.com/office/drawing/2018/hyperlinkcolor" val="tx"/>
+                    </a:ext>
+                  </a:extLst>
+                </a:hlinkClick>
+              </a:rPr>
+              <a:t>bit.ly</a:t>
+            </a:r>
+            <a:r>
+              <a:rPr lang="en-US" sz="3600" dirty="0">
+                <a:solidFill>
+                  <a:srgbClr val="00B0F0"/>
+                </a:solidFill>
+                <a:hlinkClick r:id="rId2">
+                  <a:extLst>
+                    <a:ext uri="{A12FA001-AC4F-418D-AE19-62706E023703}">
+                      <ahyp:hlinkClr xmlns:ahyp="http://schemas.microsoft.com/office/drawing/2018/hyperlinkcolor" val="tx"/>
+                    </a:ext>
+                  </a:extLst>
+                </a:hlinkClick>
+              </a:rPr>
+              <a:t>/</a:t>
+            </a:r>
+            <a:r>
+              <a:rPr lang="en-US" sz="3600" dirty="0" err="1">
+                <a:solidFill>
+                  <a:srgbClr val="00B0F0"/>
+                </a:solidFill>
+                <a:hlinkClick r:id="rId2">
+                  <a:extLst>
+                    <a:ext uri="{A12FA001-AC4F-418D-AE19-62706E023703}">
+                      <ahyp:hlinkClr xmlns:ahyp="http://schemas.microsoft.com/office/drawing/2018/hyperlinkcolor" val="tx"/>
+                    </a:ext>
+                  </a:extLst>
+                </a:hlinkClick>
+              </a:rPr>
+              <a:t>mlpp</a:t>
+            </a:r>
+            <a:r>
+              <a:rPr lang="en-US" sz="3600" dirty="0">
+                <a:solidFill>
+                  <a:srgbClr val="00B0F0"/>
+                </a:solidFill>
+                <a:hlinkClick r:id="rId2">
+                  <a:extLst>
+                    <a:ext uri="{A12FA001-AC4F-418D-AE19-62706E023703}">
+                      <ahyp:hlinkClr xmlns:ahyp="http://schemas.microsoft.com/office/drawing/2018/hyperlinkcolor" val="tx"/>
+                    </a:ext>
+                  </a:extLst>
+                </a:hlinkClick>
+              </a:rPr>
+              <a:t>-feature-bias</a:t>
+            </a:r>
+            <a:endParaRPr lang="en-US" sz="3600" dirty="0">
+              <a:solidFill>
+                <a:srgbClr val="00B0F0"/>
+              </a:solidFill>
+            </a:endParaRPr>
           </a:p>
         </p:txBody>
       </p:sp>
@@ -12876,7 +12967,7 @@
           <a:p>
             <a:r>
               <a:rPr lang="en-US" dirty="0"/>
-              <a:t>Due Friday: Proposal Peer Reviews</a:t>
+              <a:t>Due Monday: Proposal Peer Reviews</a:t>
             </a:r>
             <a:br>
               <a:rPr lang="en-US" dirty="0"/>
@@ -12940,7 +13031,7 @@
             </a:pPr>
             <a:r>
               <a:rPr lang="en-US" sz="2200" dirty="0"/>
-              <a:t>Monday: Self + Peer Contribution Survey</a:t>
+              <a:t>Wednesday: Self + Peer Contribution Survey (we’ll send this out soon)</a:t>
             </a:r>
           </a:p>
           <a:p>
@@ -12962,7 +13053,7 @@
             </a:pPr>
             <a:r>
               <a:rPr lang="en-US" sz="2200" dirty="0"/>
-              <a:t>Video + Reading for Tuesday</a:t>
+              <a:t>Reading for Tuesday</a:t>
             </a:r>
           </a:p>
           <a:p>
@@ -12981,7 +13072,7 @@
     </p:spTree>
     <p:extLst>
       <p:ext uri="{BB962C8B-B14F-4D97-AF65-F5344CB8AC3E}">
-        <p14:creationId xmlns:p14="http://schemas.microsoft.com/office/powerpoint/2010/main" val="2718674369"/>
+        <p14:creationId xmlns:p14="http://schemas.microsoft.com/office/powerpoint/2010/main" val="268741119"/>
       </p:ext>
     </p:extLst>
   </p:cSld>
@@ -13130,7 +13221,7 @@
           <a:p>
             <a:r>
               <a:rPr lang="en-US" dirty="0"/>
-              <a:t>Due Friday: Proposal Peer Reviews</a:t>
+              <a:t>Due Monday: Proposal Peer Reviews</a:t>
             </a:r>
             <a:br>
               <a:rPr lang="en-US" dirty="0"/>
@@ -13194,7 +13285,7 @@
             </a:pPr>
             <a:r>
               <a:rPr lang="en-US" sz="2200" dirty="0"/>
-              <a:t>Monday: Self + Peer Contribution Survey</a:t>
+              <a:t>Wednesday: Self + Peer Contribution Survey (we’ll send this out soon)</a:t>
             </a:r>
           </a:p>
           <a:p>

</xml_diff>